<commit_message>
vault backup: 2025-02-13 11:57:49
</commit_message>
<xml_diff>
--- a/Бухгалтерия/Документы/Основные средства предприятия.pptx
+++ b/Бухгалтерия/Документы/Основные средства предприятия.pptx
@@ -273,7 +273,7 @@
           <a:p>
             <a:fld id="{4DC4B874-ED2B-4C1D-9BD4-EA5CB6D33019}" type="datetimeFigureOut">
               <a:rPr lang="ru-RU" smtClean="0"/>
-              <a:t>12.12.2024</a:t>
+              <a:t>13.02.2025</a:t>
             </a:fld>
             <a:endParaRPr lang="ru-RU"/>
           </a:p>
@@ -471,7 +471,7 @@
           <a:p>
             <a:fld id="{4DC4B874-ED2B-4C1D-9BD4-EA5CB6D33019}" type="datetimeFigureOut">
               <a:rPr lang="ru-RU" smtClean="0"/>
-              <a:t>12.12.2024</a:t>
+              <a:t>13.02.2025</a:t>
             </a:fld>
             <a:endParaRPr lang="ru-RU"/>
           </a:p>
@@ -679,7 +679,7 @@
           <a:p>
             <a:fld id="{4DC4B874-ED2B-4C1D-9BD4-EA5CB6D33019}" type="datetimeFigureOut">
               <a:rPr lang="ru-RU" smtClean="0"/>
-              <a:t>12.12.2024</a:t>
+              <a:t>13.02.2025</a:t>
             </a:fld>
             <a:endParaRPr lang="ru-RU"/>
           </a:p>
@@ -877,7 +877,7 @@
           <a:p>
             <a:fld id="{4DC4B874-ED2B-4C1D-9BD4-EA5CB6D33019}" type="datetimeFigureOut">
               <a:rPr lang="ru-RU" smtClean="0"/>
-              <a:t>12.12.2024</a:t>
+              <a:t>13.02.2025</a:t>
             </a:fld>
             <a:endParaRPr lang="ru-RU"/>
           </a:p>
@@ -1152,7 +1152,7 @@
           <a:p>
             <a:fld id="{4DC4B874-ED2B-4C1D-9BD4-EA5CB6D33019}" type="datetimeFigureOut">
               <a:rPr lang="ru-RU" smtClean="0"/>
-              <a:t>12.12.2024</a:t>
+              <a:t>13.02.2025</a:t>
             </a:fld>
             <a:endParaRPr lang="ru-RU"/>
           </a:p>
@@ -1417,7 +1417,7 @@
           <a:p>
             <a:fld id="{4DC4B874-ED2B-4C1D-9BD4-EA5CB6D33019}" type="datetimeFigureOut">
               <a:rPr lang="ru-RU" smtClean="0"/>
-              <a:t>12.12.2024</a:t>
+              <a:t>13.02.2025</a:t>
             </a:fld>
             <a:endParaRPr lang="ru-RU"/>
           </a:p>
@@ -1829,7 +1829,7 @@
           <a:p>
             <a:fld id="{4DC4B874-ED2B-4C1D-9BD4-EA5CB6D33019}" type="datetimeFigureOut">
               <a:rPr lang="ru-RU" smtClean="0"/>
-              <a:t>12.12.2024</a:t>
+              <a:t>13.02.2025</a:t>
             </a:fld>
             <a:endParaRPr lang="ru-RU"/>
           </a:p>
@@ -1970,7 +1970,7 @@
           <a:p>
             <a:fld id="{4DC4B874-ED2B-4C1D-9BD4-EA5CB6D33019}" type="datetimeFigureOut">
               <a:rPr lang="ru-RU" smtClean="0"/>
-              <a:t>12.12.2024</a:t>
+              <a:t>13.02.2025</a:t>
             </a:fld>
             <a:endParaRPr lang="ru-RU"/>
           </a:p>
@@ -2083,7 +2083,7 @@
           <a:p>
             <a:fld id="{4DC4B874-ED2B-4C1D-9BD4-EA5CB6D33019}" type="datetimeFigureOut">
               <a:rPr lang="ru-RU" smtClean="0"/>
-              <a:t>12.12.2024</a:t>
+              <a:t>13.02.2025</a:t>
             </a:fld>
             <a:endParaRPr lang="ru-RU"/>
           </a:p>
@@ -2394,7 +2394,7 @@
           <a:p>
             <a:fld id="{4DC4B874-ED2B-4C1D-9BD4-EA5CB6D33019}" type="datetimeFigureOut">
               <a:rPr lang="ru-RU" smtClean="0"/>
-              <a:t>12.12.2024</a:t>
+              <a:t>13.02.2025</a:t>
             </a:fld>
             <a:endParaRPr lang="ru-RU"/>
           </a:p>
@@ -2682,7 +2682,7 @@
           <a:p>
             <a:fld id="{4DC4B874-ED2B-4C1D-9BD4-EA5CB6D33019}" type="datetimeFigureOut">
               <a:rPr lang="ru-RU" smtClean="0"/>
-              <a:t>12.12.2024</a:t>
+              <a:t>13.02.2025</a:t>
             </a:fld>
             <a:endParaRPr lang="ru-RU"/>
           </a:p>
@@ -2923,7 +2923,7 @@
           <a:p>
             <a:fld id="{4DC4B874-ED2B-4C1D-9BD4-EA5CB6D33019}" type="datetimeFigureOut">
               <a:rPr lang="ru-RU" smtClean="0"/>
-              <a:t>12.12.2024</a:t>
+              <a:t>13.02.2025</a:t>
             </a:fld>
             <a:endParaRPr lang="ru-RU"/>
           </a:p>
@@ -8453,27 +8453,7 @@
                 <a:effectLst/>
                 <a:latin typeface="PT Sans" panose="020B0503020203020204" pitchFamily="34" charset="-52"/>
               </a:rPr>
-              <a:t> -затраты на </a:t>
-            </a:r>
-            <a:r>
-              <a:rPr lang="ru-RU" b="0" i="0" dirty="0" err="1">
-                <a:solidFill>
-                  <a:srgbClr val="000000"/>
-                </a:solidFill>
-                <a:effectLst/>
-                <a:latin typeface="PT Sans" panose="020B0503020203020204" pitchFamily="34" charset="-52"/>
-              </a:rPr>
-              <a:t>преобретение</a:t>
-            </a:r>
-            <a:r>
-              <a:rPr lang="ru-RU" b="0" i="0" dirty="0">
-                <a:solidFill>
-                  <a:srgbClr val="000000"/>
-                </a:solidFill>
-                <a:effectLst/>
-                <a:latin typeface="PT Sans" panose="020B0503020203020204" pitchFamily="34" charset="-52"/>
-              </a:rPr>
-              <a:t>, транспортировку, установку и монтаж оборудования</a:t>
+              <a:t> -затраты на приобретение, транспортировку, установку и монтаж оборудования</a:t>
             </a:r>
             <a:endParaRPr lang="ru-RU" dirty="0"/>
           </a:p>

</xml_diff>